<commit_message>
Update Day 3 resources
</commit_message>
<xml_diff>
--- a/sk/day-03/Day-03-Slide-Deck.pptx
+++ b/sk/day-03/Day-03-Slide-Deck.pptx
@@ -226,7 +226,7 @@
           <a:p>
             <a:fld id="{B83411B5-A9B8-6D4E-A83B-91456309AD37}" type="datetimeFigureOut">
               <a:rPr lang="en-US" smtClean="0"/>
-              <a:t>1/14/26</a:t>
+              <a:t>1/22/26</a:t>
             </a:fld>
             <a:endParaRPr lang="en-US"/>
           </a:p>
@@ -2900,7 +2900,7 @@
           <a:p>
             <a:fld id="{42324503-65B2-B147-B7D0-901C284D8BB3}" type="datetimeFigureOut">
               <a:rPr lang="en-US" smtClean="0"/>
-              <a:t>1/14/26</a:t>
+              <a:t>1/22/26</a:t>
             </a:fld>
             <a:endParaRPr lang="en-US"/>
           </a:p>
@@ -4399,10 +4399,10 @@
       </p:sp>
       <p:pic>
         <p:nvPicPr>
-          <p:cNvPr id="4" name="Content Placeholder 3">
-            <a:extLst>
-              <a:ext uri="{FF2B5EF4-FFF2-40B4-BE49-F238E27FC236}">
-                <a16:creationId xmlns:a16="http://schemas.microsoft.com/office/drawing/2014/main" id="{A44A4164-85A3-F904-5987-FE720DB659F3}"/>
+          <p:cNvPr id="7" name="Content Placeholder 6" descr="A diagram of a resource selected&#10;&#10;AI-generated content may be incorrect.">
+            <a:extLst>
+              <a:ext uri="{FF2B5EF4-FFF2-40B4-BE49-F238E27FC236}">
+                <a16:creationId xmlns:a16="http://schemas.microsoft.com/office/drawing/2014/main" id="{C01E0849-55BF-2760-FE16-540F696FBC4E}"/>
               </a:ext>
             </a:extLst>
           </p:cNvPr>
@@ -4421,12 +4421,9 @@
         </p:blipFill>
         <p:spPr>
           <a:xfrm>
-            <a:off x="838200" y="1983665"/>
-            <a:ext cx="10515600" cy="3370095"/>
+            <a:off x="838200" y="2182024"/>
+            <a:ext cx="10515600" cy="2973376"/>
           </a:xfrm>
-          <a:prstGeom prst="rect">
-            <a:avLst/>
-          </a:prstGeom>
         </p:spPr>
       </p:pic>
     </p:spTree>

</xml_diff>